<commit_message>
Site updated: 2023-05-20 21:51:52
</commit_message>
<xml_diff>
--- a/image/2023-5-18/PPT.pptx
+++ b/image/2023-5-18/PPT.pptx
@@ -5,12 +5,12 @@
     <p:sldMasterId id="2147483648" r:id="rId1"/>
   </p:sldMasterIdLst>
   <p:notesMasterIdLst>
-    <p:notesMasterId r:id="rId6"/>
+    <p:notesMasterId r:id="rId4"/>
   </p:notesMasterIdLst>
   <p:sldIdLst>
     <p:sldId id="267" r:id="rId3"/>
-    <p:sldId id="257" r:id="rId4"/>
-    <p:sldId id="258" r:id="rId5"/>
+    <p:sldId id="257" r:id="rId5"/>
+    <p:sldId id="258" r:id="rId6"/>
     <p:sldId id="260" r:id="rId7"/>
     <p:sldId id="261" r:id="rId8"/>
     <p:sldId id="262" r:id="rId9"/>
@@ -21,7 +21,7 @@
   <p:sldSz cx="12192000" cy="6858000"/>
   <p:notesSz cx="6858000" cy="9144000"/>
   <p:custDataLst>
-    <p:tags r:id="rId16"/>
+    <p:tags r:id="rId17"/>
   </p:custDataLst>
   <p:defaultTextStyle>
     <a:defPPr>
@@ -137,6 +137,12 @@
 </p:presentation>
 </file>
 
+<file path=ppt/commentAuthors.xml><?xml version="1.0" encoding="utf-8"?>
+<p:cmAuthorLst xmlns:a="http://schemas.openxmlformats.org/drawingml/2006/main" xmlns:r="http://schemas.openxmlformats.org/officeDocument/2006/relationships" xmlns:p="http://schemas.openxmlformats.org/presentationml/2006/main">
+  <p:cmAuthor id="1" name="QXA" initials="Q" lastIdx="1" clrIdx="0"/>
+</p:cmAuthorLst>
+</file>
+
 <file path=ppt/notesMasters/notesMaster1.xml><?xml version="1.0" encoding="utf-8"?>
 <p:notesMaster xmlns:a="http://schemas.openxmlformats.org/drawingml/2006/main" xmlns:r="http://schemas.openxmlformats.org/officeDocument/2006/relationships" xmlns:p="http://schemas.openxmlformats.org/presentationml/2006/main">
   <p:cSld>
@@ -516,18 +522,6 @@
         <p:txBody>
           <a:bodyPr/>
           <a:p>
-            <a:r>
-              <a:rPr lang="zh-CN" altLang="en-US"/>
-              <a:t>浪漫主义是兴起于18世纪后期，然后持续发展到19世纪中期的艺术运动，那么浪漫主义跟我们平时所讲的浪漫有什么关系么？</a:t>
-            </a:r>
-            <a:r>
-              <a:rPr lang="en-US" altLang="zh-CN"/>
-              <a:t> </a:t>
-            </a:r>
-            <a:r>
-              <a:rPr lang="zh-CN" altLang="en-US"/>
-              <a:t>今天，当我们提到浪漫这个词时，会很容易和热恋中的情侣产生关联，或者是在结婚纪念日当天，一个丈夫下班后，买了一束玫瑰花送给他的妻子……这些都是我们对于浪漫这个词的第一印象。而我们所说的浪漫主义跟浪漫有些不一样，浪漫是指虚构、传奇，而浪漫主义则是来源于中世纪的“传奇”一词，最早使用是在18世纪的晚期。当时人们普遍对古代的冒险离奇事件感兴趣，后来，人们就把那些同传奇故事、离奇遭遇、想象色彩相关联的事统统成为浪漫主义。</a:t>
-            </a:r>
             <a:endParaRPr lang="zh-CN" altLang="en-US"/>
           </a:p>
         </p:txBody>
@@ -574,7 +568,15 @@
           <a:p>
             <a:r>
               <a:rPr lang="zh-CN" altLang="en-US"/>
-              <a:t>十八世纪末至十九世纪初的欧洲各国，工业的发展一路高歌猛进。正是在工 业革命的推动下使得当时欧洲及北美地区的生产力水平提升到了空前的高度，自 给自足的小农经济在欧洲大陆逐渐解体，进而迈入了工业化时代。也正是由于工 业革命，落后的生产方式和封建专制的社会结构已经成为时代的绊脚石，使得上 升的资产阶级与没落的封建贵族进行着激烈的反复的权力斗争。新兴的城市资产 阶级标榜的“自由”、“平等”、“博爱”，都成为击垮陈旧封建文化秩序的有力武器。18 世纪末发生的法国大革命彻底瓦解了欧洲传统的政治统治，随之，在德国、 英国、法国以至全欧洲，出现了一股强大的思潮——浪漫主义。它像一位人们在 精神迷惑和惶恐中期盼的神袛走遍全欧，把一种尖锐而又含混的精神气质带到人 们的心中。</a:t>
+              <a:t>浪漫主义是兴起于18世纪后期，然后持续发展到19世纪中期的艺术运动，那么浪漫主义跟我们平时所讲的浪漫有什么关系么？</a:t>
+            </a:r>
+            <a:r>
+              <a:rPr lang="en-US" altLang="zh-CN"/>
+              <a:t> </a:t>
+            </a:r>
+            <a:r>
+              <a:rPr lang="zh-CN" altLang="en-US"/>
+              <a:t>今天，当我们提到浪漫这个词时，会很容易和热恋中的情侣产生关联，或者是在结婚纪念日当天，一个丈夫下班后，买了一束玫瑰花送给他的妻子……这些都是我们对于浪漫这个词的第一印象。而我们所说的浪漫主义跟浪漫有些不一样，浪漫是指虚构、传奇，而浪漫主义则是来源于中世纪的“传奇”一词，最早使用是在18世纪的晚期。当时人们普遍对古代的冒险离奇事件感兴趣，后来，人们就把那些同传奇故事、离奇遭遇、想象色彩相关联的事统统成为浪漫主义。</a:t>
             </a:r>
             <a:endParaRPr lang="zh-CN" altLang="en-US"/>
           </a:p>
@@ -622,7 +624,7 @@
           <a:p>
             <a:r>
               <a:rPr lang="zh-CN" altLang="en-US"/>
-              <a:t>现在介绍的是欧仁·德拉克罗瓦，法国著名画家。他是浪漫主义画派的典型代表。他继承和发展了文艺复兴以来欧洲各艺术流派，包括威尼斯画派、荷兰画派、彼得·保罗·鲁本斯和约翰·康斯特布尔等艺术家的成就和传统，并影响了以后的艺术家，特别是印象主义画家。他的主要作品有《十字军占领君士坦丁堡》《希奥岛的屠杀》《但丁之舟》等。</a:t>
+              <a:t>十八世纪末至十九世纪初的欧洲各国，工业的发展一路高歌猛进。正是在工 业革命的推动下使得当时欧洲及北美地区的生产力水平提升到了空前的高度，自 给自足的小农经济在欧洲大陆逐渐解体，进而迈入了工业化时代。也正是由于工 业革命，落后的生产方式和封建专制的社会结构已经成为时代的绊脚石，使得上 升的资产阶级与没落的封建贵族进行着激烈的反复的权力斗争。新兴的城市资产 阶级标榜的“自由”、“平等”、“博爱”，都成为击垮陈旧封建文化秩序的有力武器。18 世纪末发生的法国大革命彻底瓦解了欧洲传统的政治统治，随之，在德国、 英国、法国以至全欧洲，出现了一股强大的思潮——浪漫主义。它像一位人们在 精神迷惑和惶恐中期盼的神袛走遍全欧，把一种尖锐而又含混的精神气质带到人 们的心中。</a:t>
             </a:r>
             <a:endParaRPr lang="zh-CN" altLang="en-US"/>
           </a:p>
@@ -670,7 +672,7 @@
           <a:p>
             <a:r>
               <a:rPr lang="zh-CN" altLang="en-US"/>
-              <a:t>该画取材于真实的历史事件，表现如火如荼的革命场景，包括其中有原型的历史人物开象以及作者自身的参与，都表现了这幅画高度的现实意义。但这幅画被称作德拉克洛瓦浪漫主义风格的代表作，则是因为这幅画中的场景是颇为集中的浪漫主义场景，其中的自由女神更是具备“半人半神气质的一个理想化人物”。她长着古希雕塑般的轮廓，露上身，穿着朴索古典的衣着，走在革命队伍的前面，右手高举：三色旗。脸朝向人群，似在号召着人们革命到底。这样就能获得自由。与周围身穿现代服装的男士们相比，她更像一个抽象的人，代表着最高的精神与意义。她健康、有力、坚决、美丽朴素，领导着工人、知识分子的革命队伍奋勇前进，寄托了国家的革命感情和对英雄气概的向往。恰如其分地表现了现代社会最核心的政治主题：自由与民主。这幅画取材自1815年拿破仑下台后，逃亡国外的路易十八重返法国当国王，这就是“波旁王朝”第二次复辟，封建势力重新猖獗。1830年7月，路易十八的继承人查理十世企图进一步增强皇权，限制人民的选举权和出版自由并宣布解散议会。1830年7月26日，巴黎市民闻讯纷纷起义。他们拿起武器，走向街垒，为推翻这个复辟的波旁王朝浴血奋战，27至29日为推翻波旁王朝，与保皇党展开了战斗，最后占领了王宫，查理十世逃亡英国。在历史上称为“光荣的三天”。在这次战斗中，一位名叫克拉拉·莱辛的姑娘首先在街垒上举起了象征法兰西共和制的三色旗；少年阿莱尔把这面旗帜插到巴黎圣母院旁的一座桥头时，中弹倒下。画家德拉克洛瓦目击了这一悲壮激烈景象，又义愤填膺，决心为之画一幅画作为永久的纪念。</a:t>
+              <a:t>现在介绍的是欧仁·德拉克罗瓦，法国著名画家。他是浪漫主义画派的典型代表。他继承和发展了文艺复兴以来欧洲各艺术流派，包括威尼斯画派、荷兰画派、彼得·保罗·鲁本斯和约翰·康斯特布尔等艺术家的成就和传统，并影响了以后的艺术家，特别是印象主义画家。他的主要作品有《十字军占领君士坦丁堡》《希奥岛的屠杀》《但丁之舟》等。</a:t>
             </a:r>
             <a:endParaRPr lang="zh-CN" altLang="en-US"/>
           </a:p>
@@ -685,6 +687,54 @@
 </file>
 
 <file path=ppt/notesSlides/notesSlide5.xml><?xml version="1.0" encoding="utf-8"?>
+<p:notes xmlns:a="http://schemas.openxmlformats.org/drawingml/2006/main" xmlns:r="http://schemas.openxmlformats.org/officeDocument/2006/relationships" xmlns:p="http://schemas.openxmlformats.org/presentationml/2006/main">
+  <p:cSld>
+    <p:spTree>
+      <p:nvGrpSpPr>
+        <p:cNvPr id="1" name=""/>
+        <p:cNvGrpSpPr/>
+        <p:nvPr/>
+      </p:nvGrpSpPr>
+      <p:grpSpPr/>
+      <p:sp>
+        <p:nvSpPr>
+          <p:cNvPr id="2" name="幻灯片图像占位符 1"/>
+          <p:cNvSpPr/>
+          <p:nvPr>
+            <p:ph type="sldImg" idx="2"/>
+          </p:nvPr>
+        </p:nvSpPr>
+        <p:spPr/>
+      </p:sp>
+      <p:sp>
+        <p:nvSpPr>
+          <p:cNvPr id="3" name="文本占位符 2"/>
+          <p:cNvSpPr/>
+          <p:nvPr>
+            <p:ph type="body" idx="3"/>
+          </p:nvPr>
+        </p:nvSpPr>
+        <p:spPr/>
+        <p:txBody>
+          <a:bodyPr/>
+          <a:p>
+            <a:r>
+              <a:rPr lang="zh-CN" altLang="en-US"/>
+              <a:t>该画取材于真实的历史事件，表现如火如荼的革命场景，包括其中有原型的历史人物开象以及作者自身的参与，都表现了这幅画高度的现实意义。但这幅画被称作德拉克洛瓦浪漫主义风格的代表作，则是因为这幅画中的场景是颇为集中的浪漫主义场景，其中的自由女神更是具备“半人半神气质的一个理想化人物”。她长着古希雕塑般的轮廓，露上身，穿着朴索古典的衣着，走在革命队伍的前面，右手高举：三色旗。脸朝向人群，似在号召着人们革命到底。这样就能获得自由。与周围身穿现代服装的男士们相比，她更像一个抽象的人，代表着最高的精神与意义。她健康、有力、坚决、美丽朴素，领导着工人、知识分子的革命队伍奋勇前进，寄托了国家的革命感情和对英雄气概的向往。恰如其分地表现了现代社会最核心的政治主题：自由与民主。这幅画取材自1815年拿破仑下台后，逃亡国外的路易十八重返法国当国王，这就是“波旁王朝”第二次复辟，封建势力重新猖獗。1830年7月，路易十八的继承人查理十世企图进一步增强皇权，限制人民的选举权和出版自由并宣布解散议会。1830年7月26日，巴黎市民闻讯纷纷起义。他们拿起武器，走向街垒，为推翻这个复辟的波旁王朝浴血奋战，27至29日为推翻波旁王朝，与保皇党展开了战斗，最后占领了王宫，查理十世逃亡英国。在历史上称为“光荣的三天”。在这次战斗中，一位名叫克拉拉·莱辛的姑娘首先在街垒上举起了象征法兰西共和制的三色旗；少年阿莱尔把这面旗帜插到巴黎圣母院旁的一座桥头时，中弹倒下。画家德拉克洛瓦目击了这一悲壮激烈景象，又义愤填膺，决心为之画一幅画作为永久的纪念。</a:t>
+            </a:r>
+            <a:endParaRPr lang="zh-CN" altLang="en-US"/>
+          </a:p>
+        </p:txBody>
+      </p:sp>
+    </p:spTree>
+  </p:cSld>
+  <p:clrMapOvr>
+    <a:masterClrMapping/>
+  </p:clrMapOvr>
+</p:notes>
+</file>
+
+<file path=ppt/notesSlides/notesSlide6.xml><?xml version="1.0" encoding="utf-8"?>
 <p:notes xmlns:a="http://schemas.openxmlformats.org/drawingml/2006/main" xmlns:r="http://schemas.openxmlformats.org/officeDocument/2006/relationships" xmlns:p="http://schemas.openxmlformats.org/presentationml/2006/main">
   <p:cSld>
     <p:spTree>
@@ -766,7 +816,7 @@
 </p:notes>
 </file>
 
-<file path=ppt/notesSlides/notesSlide6.xml><?xml version="1.0" encoding="utf-8"?>
+<file path=ppt/notesSlides/notesSlide7.xml><?xml version="1.0" encoding="utf-8"?>
 <p:notes xmlns:a="http://schemas.openxmlformats.org/drawingml/2006/main" xmlns:r="http://schemas.openxmlformats.org/officeDocument/2006/relationships" xmlns:p="http://schemas.openxmlformats.org/presentationml/2006/main">
   <p:cSld>
     <p:spTree>
@@ -820,7 +870,7 @@
 </p:notes>
 </file>
 
-<file path=ppt/notesSlides/notesSlide7.xml><?xml version="1.0" encoding="utf-8"?>
+<file path=ppt/notesSlides/notesSlide8.xml><?xml version="1.0" encoding="utf-8"?>
 <p:notes xmlns:a="http://schemas.openxmlformats.org/drawingml/2006/main" xmlns:r="http://schemas.openxmlformats.org/officeDocument/2006/relationships" xmlns:p="http://schemas.openxmlformats.org/presentationml/2006/main">
   <p:cSld>
     <p:spTree>
@@ -9125,6 +9175,16 @@
           <a:p>
             <a:r>
               <a:rPr lang="zh-CN" altLang="zh-CN" sz="1000"/>
+              <a:t>讲稿：</a:t>
+            </a:r>
+            <a:endParaRPr lang="zh-CN" altLang="zh-CN" sz="1000"/>
+          </a:p>
+          <a:p>
+            <a:endParaRPr lang="zh-CN" altLang="zh-CN" sz="1000"/>
+          </a:p>
+          <a:p>
+            <a:r>
+              <a:rPr lang="zh-CN" altLang="zh-CN" sz="1000"/>
               <a:t>大家好啊，我是</a:t>
             </a:r>
             <a:r>
@@ -9262,6 +9322,39 @@
           </a:p>
           <a:p>
             <a:endParaRPr lang="zh-CN" altLang="en-US" sz="1000"/>
+          </a:p>
+        </p:txBody>
+      </p:sp>
+      <p:sp>
+        <p:nvSpPr>
+          <p:cNvPr id="3" name="文本框 2"/>
+          <p:cNvSpPr txBox="1"/>
+          <p:nvPr/>
+        </p:nvSpPr>
+        <p:spPr>
+          <a:xfrm>
+            <a:off x="742950" y="1708785"/>
+            <a:ext cx="11106150" cy="4464050"/>
+          </a:xfrm>
+          <a:prstGeom prst="rect">
+            <a:avLst/>
+          </a:prstGeom>
+          <a:noFill/>
+        </p:spPr>
+        <p:txBody>
+          <a:bodyPr wrap="square" rtlCol="0">
+            <a:noAutofit/>
+          </a:bodyPr>
+          <a:p>
+            <a:r>
+              <a:rPr lang="zh-CN" altLang="en-US" sz="8000"/>
+              <a:t>注意，此页为演讲稿，上台前请删除此页或从第二页开始</a:t>
+            </a:r>
+            <a:r>
+              <a:rPr lang="zh-CN" altLang="en-US" sz="8000"/>
+              <a:t>播放</a:t>
+            </a:r>
+            <a:endParaRPr lang="zh-CN" altLang="en-US" sz="8000"/>
           </a:p>
         </p:txBody>
       </p:sp>
@@ -9330,6 +9423,100 @@
               <a:t>欧洲浪漫主义</a:t>
             </a:r>
             <a:endParaRPr lang="zh-CN" altLang="zh-CN" dirty="0"/>
+          </a:p>
+        </p:txBody>
+      </p:sp>
+      <p:sp>
+        <p:nvSpPr>
+          <p:cNvPr id="3" name="文本框 2"/>
+          <p:cNvSpPr txBox="1"/>
+          <p:nvPr/>
+        </p:nvSpPr>
+        <p:spPr>
+          <a:xfrm>
+            <a:off x="2502535" y="4100195"/>
+            <a:ext cx="7185660" cy="1764030"/>
+          </a:xfrm>
+          <a:prstGeom prst="rect">
+            <a:avLst/>
+          </a:prstGeom>
+          <a:noFill/>
+        </p:spPr>
+        <p:txBody>
+          <a:bodyPr wrap="square" rtlCol="0">
+            <a:noAutofit/>
+          </a:bodyPr>
+          <a:p>
+            <a:pPr algn="ctr"/>
+            <a:r>
+              <a:rPr lang="zh-CN" altLang="zh-CN" spc="600" dirty="0">
+                <a:solidFill>
+                  <a:schemeClr val="accent1"/>
+                </a:solidFill>
+                <a:uFillTx/>
+                <a:latin typeface="微软雅黑" panose="020B0503020204020204" charset="-122"/>
+                <a:ea typeface="汉仪旗黑-85S" panose="00020600040101010101" pitchFamily="18" charset="-122"/>
+                <a:cs typeface="+mj-cs"/>
+              </a:rPr>
+              <a:t>发言者：李世海</a:t>
+            </a:r>
+            <a:endParaRPr lang="zh-CN" altLang="zh-CN" spc="600" dirty="0">
+              <a:solidFill>
+                <a:schemeClr val="accent1"/>
+              </a:solidFill>
+              <a:uFillTx/>
+              <a:latin typeface="微软雅黑" panose="020B0503020204020204" charset="-122"/>
+              <a:ea typeface="汉仪旗黑-85S" panose="00020600040101010101" pitchFamily="18" charset="-122"/>
+              <a:cs typeface="+mj-cs"/>
+            </a:endParaRPr>
+          </a:p>
+          <a:p>
+            <a:pPr algn="ctr"/>
+            <a:r>
+              <a:rPr lang="zh-CN" altLang="zh-CN" spc="600" dirty="0">
+                <a:solidFill>
+                  <a:schemeClr val="accent1"/>
+                </a:solidFill>
+                <a:uFillTx/>
+                <a:latin typeface="微软雅黑" panose="020B0503020204020204" charset="-122"/>
+                <a:ea typeface="汉仪旗黑-85S" panose="00020600040101010101" pitchFamily="18" charset="-122"/>
+                <a:cs typeface="+mj-cs"/>
+              </a:rPr>
+              <a:t>PPT编辑：杨浩森</a:t>
+            </a:r>
+            <a:endParaRPr lang="zh-CN" altLang="zh-CN" spc="600" dirty="0">
+              <a:solidFill>
+                <a:schemeClr val="accent1"/>
+              </a:solidFill>
+              <a:uFillTx/>
+              <a:latin typeface="微软雅黑" panose="020B0503020204020204" charset="-122"/>
+              <a:ea typeface="汉仪旗黑-85S" panose="00020600040101010101" pitchFamily="18" charset="-122"/>
+              <a:cs typeface="+mj-cs"/>
+            </a:endParaRPr>
+          </a:p>
+          <a:p>
+            <a:pPr algn="ctr"/>
+            <a:r>
+              <a:rPr lang="zh-CN" altLang="zh-CN" spc="600" dirty="0">
+                <a:solidFill>
+                  <a:schemeClr val="accent1"/>
+                </a:solidFill>
+                <a:uFillTx/>
+                <a:latin typeface="微软雅黑" panose="020B0503020204020204" charset="-122"/>
+                <a:ea typeface="汉仪旗黑-85S" panose="00020600040101010101" pitchFamily="18" charset="-122"/>
+                <a:cs typeface="+mj-cs"/>
+              </a:rPr>
+              <a:t>组员：李世海，杨浩森，刘昊翔，李振峰</a:t>
+            </a:r>
+            <a:endParaRPr lang="zh-CN" altLang="zh-CN" spc="600" dirty="0">
+              <a:solidFill>
+                <a:schemeClr val="accent1"/>
+              </a:solidFill>
+              <a:uFillTx/>
+              <a:latin typeface="微软雅黑" panose="020B0503020204020204" charset="-122"/>
+              <a:ea typeface="汉仪旗黑-85S" panose="00020600040101010101" pitchFamily="18" charset="-122"/>
+              <a:cs typeface="+mj-cs"/>
+            </a:endParaRPr>
           </a:p>
         </p:txBody>
       </p:sp>
@@ -9927,8 +10114,8 @@
         </p:nvSpPr>
         <p:spPr>
           <a:xfrm>
-            <a:off x="455775" y="1052965"/>
-            <a:ext cx="5342400" cy="2894400"/>
+            <a:off x="455930" y="1052830"/>
+            <a:ext cx="5342255" cy="3884930"/>
           </a:xfrm>
           <a:ln w="76200">
             <a:solidFill>
@@ -9941,11 +10128,46 @@
             <a:noAutofit/>
           </a:bodyPr>
           <a:p>
-            <a:r>
-              <a:rPr lang="zh-CN" altLang="en-US" sz="900"/>
-              <a:t>《自由引导人民》是画家在上百幅“七月革命”街战的草图的基础上定稿的画面，全画采取顶天立地的构图形式。倒在地上的尸体、战斗的勇士以及高举法兰西旗帜的女子，构成一个稳定又蕴藏动势的三角形。象征自由、平等、博爱的三色旗位于等腰三角形的顶点，自由女神的人群的头部的横竖黄金分割线的位置，场面宏伟，构图组织井然有序。他们身后都是一往无前的战士，远处的建筑是巴黎市中心的标志——巴黎圣母院。以一个象征自由的女神形象为主体，德拉克洛瓦的浪漫气质造就了这样一位袒胸露怀的女子形象，招呼着后方的人民，将神话中的自由女神与浴血奋战的人民安排到一起，她长着希腊雕塑般的轮廓，穿着朴素古典的衣着，与周围身穿现代服装的男士们相比，她更像一个抽象的人，代表着最高的精神与意义。紧跟她前后左右的是工人、市民、孩子、学生等。她的右方是一个持着双枪的少年，急速向前奔跑，表现了为了自由全民参战的的情景,他象征少年英雄阿莱尔。一名受了重伤的青年工人正抬头仰望自由女神的三色旗，前景右侧有两名政府军的士兵倒毙在地上，左侧躺着一位为自由而献身的起义者。他们手持武器，踏着血迹和尸体奋勇前进。她的身后有两个工人挥舞着尖刀，表情刚毅，显示出愤怒的神色。人群上方则是阴霾的天空。画面中一名头戴高礼帽、身穿燕尾服、手中紧握长枪的人，大声疾呼，号召人民以伟大的过去为榜样，起来进行斗争，进行革命。</a:t>
-            </a:r>
-            <a:endParaRPr lang="zh-CN" altLang="en-US" sz="900"/>
+            <a:pPr marL="0" algn="ctr">
+              <a:lnSpc>
+                <a:spcPct val="100000"/>
+              </a:lnSpc>
+              <a:buClrTx/>
+              <a:buSzTx/>
+            </a:pPr>
+            <a:endParaRPr lang="zh-CN" altLang="zh-CN" sz="1200" spc="600" dirty="0">
+              <a:solidFill>
+                <a:schemeClr val="accent1"/>
+              </a:solidFill>
+              <a:ea typeface="汉仪旗黑-85S" panose="00020600040101010101" pitchFamily="18" charset="-122"/>
+              <a:cs typeface="+mj-cs"/>
+            </a:endParaRPr>
+          </a:p>
+          <a:p>
+            <a:pPr marL="0" algn="ctr">
+              <a:lnSpc>
+                <a:spcPct val="100000"/>
+              </a:lnSpc>
+              <a:buClrTx/>
+              <a:buSzTx/>
+            </a:pPr>
+            <a:r>
+              <a:rPr lang="zh-CN" altLang="zh-CN" sz="1200" spc="600" dirty="0">
+                <a:solidFill>
+                  <a:schemeClr val="accent1"/>
+                </a:solidFill>
+                <a:ea typeface="汉仪旗黑-85S" panose="00020600040101010101" pitchFamily="18" charset="-122"/>
+                <a:cs typeface="+mj-cs"/>
+              </a:rPr>
+              <a:t>《自由引导人民》是画家根据上百幅“七月革命”街战的草图创作的作品。全画采用顶天立地的构图形式，倒在地上的尸体、战斗的勇士以及高举法兰西旗帜的女子构成一个稳定又蕴藏动势的三角形。象征自由、平等、博爱的三色旗位于等腰三角形的顶点。场面宏伟，构图组织井然有序。以一个象征自由的女神形象为主体，她长着希腊雕塑般的轮廓，穿着朴素古典的衣着。紧跟她前后左右的是工人、市民、孩子、学生等。她的右方是急速向前奔跑的少年英雄阿莱尔，一名受了重伤的青年工人正抬头仰望自由女神的三色旗，前景右侧有两名政府军的士兵倒毙在地上，左侧躺着一位为自由而献身的起义者。他们手持武器，踏着血迹和尸体奋勇前进。她的身后有两个工人挥舞着尖刀，表情刚毅，显示出愤怒的神色。画面中的人物背景是巴黎市中心的标志——巴黎圣母院。一名头戴高礼帽、身穿燕尾服、手中紧握长枪的人，大声疾呼，号召人民进行革命斗争。</a:t>
+            </a:r>
+            <a:endParaRPr lang="zh-CN" altLang="zh-CN" sz="1200" spc="600" dirty="0">
+              <a:solidFill>
+                <a:schemeClr val="accent1"/>
+              </a:solidFill>
+              <a:ea typeface="汉仪旗黑-85S" panose="00020600040101010101" pitchFamily="18" charset="-122"/>
+              <a:cs typeface="+mj-cs"/>
+            </a:endParaRPr>
           </a:p>
         </p:txBody>
       </p:sp>
@@ -10034,6 +10256,11 @@
             <a:noAutofit/>
           </a:bodyPr>
           <a:p>
+            <a:pPr lvl="0" algn="l">
+              <a:buClrTx/>
+              <a:buSzTx/>
+              <a:buFontTx/>
+            </a:pPr>
             <a:r>
               <a:rPr lang="zh-CN" altLang="en-US" sz="2000">
                 <a:sym typeface="+mn-ea"/>

</xml_diff>

<commit_message>
Site updated: 2023-07-09 21:31:22
</commit_message>
<xml_diff>
--- a/image/2023-5-18/PPT.pptx
+++ b/image/2023-5-18/PPT.pptx
@@ -126,7 +126,7 @@
             <a:srgbClr val="A4A3A4"/>
           </p15:clr>
         </p15:guide>
-        <p15:guide id="2" pos="3839" userDrawn="1">
+        <p15:guide id="2" pos="3819" userDrawn="1">
           <p15:clr>
             <a:srgbClr val="A4A3A4"/>
           </p15:clr>
@@ -9193,7 +9193,7 @@
             </a:r>
             <a:r>
               <a:rPr lang="zh-CN" altLang="en-US" sz="1000"/>
-              <a:t>，今天来给大家想看的东西啊。现在介绍的是欧洲浪漫主义，那么这个所谓的浪漫主义是个什么东西呢？</a:t>
+              <a:t>，今天来给大家介绍欧洲浪漫主义，那么这个所谓的浪漫主义是个什么东西呢？</a:t>
             </a:r>
             <a:endParaRPr lang="zh-CN" altLang="en-US" sz="1000"/>
           </a:p>
@@ -10135,7 +10135,7 @@
               <a:buClrTx/>
               <a:buSzTx/>
             </a:pPr>
-            <a:endParaRPr lang="zh-CN" altLang="zh-CN" sz="1200" spc="600" dirty="0">
+            <a:endParaRPr lang="zh-CN" altLang="zh-CN" sz="1800" spc="600" dirty="0">
               <a:solidFill>
                 <a:schemeClr val="accent1"/>
               </a:solidFill>
@@ -10152,16 +10152,16 @@
               <a:buSzTx/>
             </a:pPr>
             <a:r>
-              <a:rPr lang="zh-CN" altLang="zh-CN" sz="1200" spc="600" dirty="0">
+              <a:rPr lang="zh-CN" altLang="zh-CN" sz="1800" spc="600" dirty="0">
                 <a:solidFill>
                   <a:schemeClr val="accent1"/>
                 </a:solidFill>
                 <a:ea typeface="汉仪旗黑-85S" panose="00020600040101010101" pitchFamily="18" charset="-122"/>
                 <a:cs typeface="+mj-cs"/>
               </a:rPr>
-              <a:t>《自由引导人民》是画家根据上百幅“七月革命”街战的草图创作的作品。全画采用顶天立地的构图形式，倒在地上的尸体、战斗的勇士以及高举法兰西旗帜的女子构成一个稳定又蕴藏动势的三角形。象征自由、平等、博爱的三色旗位于等腰三角形的顶点。场面宏伟，构图组织井然有序。以一个象征自由的女神形象为主体，她长着希腊雕塑般的轮廓，穿着朴素古典的衣着。紧跟她前后左右的是工人、市民、孩子、学生等。她的右方是急速向前奔跑的少年英雄阿莱尔，一名受了重伤的青年工人正抬头仰望自由女神的三色旗，前景右侧有两名政府军的士兵倒毙在地上，左侧躺着一位为自由而献身的起义者。他们手持武器，踏着血迹和尸体奋勇前进。她的身后有两个工人挥舞着尖刀，表情刚毅，显示出愤怒的神色。画面中的人物背景是巴黎市中心的标志——巴黎圣母院。一名头戴高礼帽、身穿燕尾服、手中紧握长枪的人，大声疾呼，号召人民进行革命斗争。</a:t>
-            </a:r>
-            <a:endParaRPr lang="zh-CN" altLang="zh-CN" sz="1200" spc="600" dirty="0">
+              <a:t>《自由引导人民》是根据上百幅“七月革命”街战草图创作的作品。画面中，倒在地上的尸体、战斗的勇士和高举法兰西旗帜的女子形成一个稳定又蕴藏动势的三角形。顶点处有象征自由、平等、博爱的三色旗。主体是象征自由的女神形象，身后有工人、市民、孩子、学生等。画面中还有受伤的工人、政府军士兵和为自由献身的起义者。背景是巴黎圣母院。一名头戴高礼帽、身穿燕尾服、手握长枪的人呼吁人民进行革命斗争。</a:t>
+            </a:r>
+            <a:endParaRPr lang="zh-CN" altLang="zh-CN" sz="1800" spc="600" dirty="0">
               <a:solidFill>
                 <a:schemeClr val="accent1"/>
               </a:solidFill>
@@ -10347,8 +10347,8 @@
         </p:nvSpPr>
         <p:spPr>
           <a:xfrm>
-            <a:off x="1520190" y="4315460"/>
-            <a:ext cx="9087485" cy="1198880"/>
+            <a:off x="2847975" y="4193540"/>
+            <a:ext cx="6771640" cy="2663825"/>
           </a:xfrm>
           <a:prstGeom prst="rect">
             <a:avLst/>
@@ -10357,14 +10357,68 @@
         </p:spPr>
         <p:txBody>
           <a:bodyPr wrap="square" rtlCol="0" anchor="t">
-            <a:spAutoFit/>
+            <a:noAutofit/>
           </a:bodyPr>
           <a:p>
             <a:r>
-              <a:rPr lang="zh-CN" altLang="en-US"/>
-              <a:t>参考资料：哗哩哗哩-欧洲浪漫主义https://yhsome.github.io/2023/05/17/%E5%93%97%E5%93%A9%E5%93%97%E5%93%A9-%E6%AC%A7%E6%B4%B2%E6%B5%AA%E6%BC%AB%E4%B8%BB%E4%B9%89/</a:t>
-            </a:r>
-            <a:endParaRPr lang="zh-CN" altLang="en-US"/>
+              <a:rPr lang="zh-CN" altLang="en-US" sz="1400"/>
+              <a:t>引用的图片及参考资料链接：</a:t>
+            </a:r>
+            <a:endParaRPr lang="zh-CN" altLang="en-US" sz="1400"/>
+          </a:p>
+          <a:p>
+            <a:r>
+              <a:rPr lang="en-US" altLang="zh-CN" sz="1400"/>
+              <a:t>985so</a:t>
+            </a:r>
+            <a:r>
+              <a:rPr lang="zh-CN" altLang="en-US" sz="1400"/>
+              <a:t>：http://9291.zjin.org/3b</a:t>
+            </a:r>
+            <a:endParaRPr lang="zh-CN" altLang="en-US" sz="1400"/>
+          </a:p>
+          <a:p>
+            <a:pPr marL="457200" lvl="1" indent="457200"/>
+            <a:r>
+              <a:rPr lang="en-US" altLang="zh-CN" sz="1400"/>
+              <a:t>http://929v.zjin.org/08</a:t>
+            </a:r>
+            <a:endParaRPr lang="en-US" altLang="zh-CN" sz="1400"/>
+          </a:p>
+          <a:p>
+            <a:r>
+              <a:rPr lang="zh-CN" altLang="en-US" sz="1400"/>
+              <a:t>百度百科：</a:t>
+            </a:r>
+            <a:endParaRPr lang="zh-CN" altLang="en-US" sz="1400"/>
+          </a:p>
+          <a:p>
+            <a:r>
+              <a:rPr lang="zh-CN" altLang="en-US" sz="1400"/>
+              <a:t>https://baike.baidu.com/item/%E6%AC%A7%E4%BB%81%C2%B7%E5%BE%B7%E6%8B%89%E5%85%8B%E7%BD%97%E7%93%A6/2160053</a:t>
+            </a:r>
+            <a:endParaRPr lang="zh-CN" altLang="en-US" sz="1400"/>
+          </a:p>
+          <a:p>
+            <a:r>
+              <a:rPr lang="en-US" altLang="zh-CN" sz="1400"/>
+              <a:t>bing</a:t>
+            </a:r>
+            <a:r>
+              <a:rPr lang="zh-CN" altLang="en-US" sz="1400"/>
+              <a:t>：</a:t>
+            </a:r>
+            <a:endParaRPr lang="zh-CN" altLang="en-US" sz="1400"/>
+          </a:p>
+          <a:p>
+            <a:r>
+              <a:rPr lang="zh-CN" altLang="en-US" sz="1400"/>
+              <a:t>https://ts1.cn.mm.bing.net/th/id/R-C.c331e8e164dba3c7ebd36181dbd95d8c?rik=tC3KppeX4MvpyA&amp;riu=http%3a%2f%2fwww.163668.cn%2fUPloadpic%2f200982523563588800.jpg&amp;ehk=e8l70sEMWS0Ust18pmTiy4%2bG%2fo5rxjE3c1YVN3DNMT8%3d&amp;risl=&amp;pid=ImgRaw&amp;r=0</a:t>
+            </a:r>
+            <a:endParaRPr lang="zh-CN" altLang="en-US" sz="1400"/>
+          </a:p>
+          <a:p>
+            <a:endParaRPr lang="zh-CN" altLang="en-US" sz="1400"/>
           </a:p>
         </p:txBody>
       </p:sp>

</xml_diff>